<commit_message>
fixed typos and rephrased some text
</commit_message>
<xml_diff>
--- a/ONP_Poster.pptx
+++ b/ONP_Poster.pptx
@@ -243,7 +243,7 @@
           <a:p>
             <a:fld id="{91D93EDB-D79D-4870-A6D4-E6A65D35F88E}" type="datetimeFigureOut">
               <a:rPr lang="en-DK" smtClean="0"/>
-              <a:t>04/11/2024</a:t>
+              <a:t>11/5/24</a:t>
             </a:fld>
             <a:endParaRPr lang="en-DK"/>
           </a:p>
@@ -413,7 +413,7 @@
           <a:p>
             <a:fld id="{91D93EDB-D79D-4870-A6D4-E6A65D35F88E}" type="datetimeFigureOut">
               <a:rPr lang="en-DK" smtClean="0"/>
-              <a:t>04/11/2024</a:t>
+              <a:t>11/5/24</a:t>
             </a:fld>
             <a:endParaRPr lang="en-DK"/>
           </a:p>
@@ -593,7 +593,7 @@
           <a:p>
             <a:fld id="{91D93EDB-D79D-4870-A6D4-E6A65D35F88E}" type="datetimeFigureOut">
               <a:rPr lang="en-DK" smtClean="0"/>
-              <a:t>04/11/2024</a:t>
+              <a:t>11/5/24</a:t>
             </a:fld>
             <a:endParaRPr lang="en-DK"/>
           </a:p>
@@ -763,7 +763,7 @@
           <a:p>
             <a:fld id="{91D93EDB-D79D-4870-A6D4-E6A65D35F88E}" type="datetimeFigureOut">
               <a:rPr lang="en-DK" smtClean="0"/>
-              <a:t>04/11/2024</a:t>
+              <a:t>11/5/24</a:t>
             </a:fld>
             <a:endParaRPr lang="en-DK"/>
           </a:p>
@@ -1009,7 +1009,7 @@
           <a:p>
             <a:fld id="{91D93EDB-D79D-4870-A6D4-E6A65D35F88E}" type="datetimeFigureOut">
               <a:rPr lang="en-DK" smtClean="0"/>
-              <a:t>04/11/2024</a:t>
+              <a:t>11/5/24</a:t>
             </a:fld>
             <a:endParaRPr lang="en-DK"/>
           </a:p>
@@ -1241,7 +1241,7 @@
           <a:p>
             <a:fld id="{91D93EDB-D79D-4870-A6D4-E6A65D35F88E}" type="datetimeFigureOut">
               <a:rPr lang="en-DK" smtClean="0"/>
-              <a:t>04/11/2024</a:t>
+              <a:t>11/5/24</a:t>
             </a:fld>
             <a:endParaRPr lang="en-DK"/>
           </a:p>
@@ -1608,7 +1608,7 @@
           <a:p>
             <a:fld id="{91D93EDB-D79D-4870-A6D4-E6A65D35F88E}" type="datetimeFigureOut">
               <a:rPr lang="en-DK" smtClean="0"/>
-              <a:t>04/11/2024</a:t>
+              <a:t>11/5/24</a:t>
             </a:fld>
             <a:endParaRPr lang="en-DK"/>
           </a:p>
@@ -1726,7 +1726,7 @@
           <a:p>
             <a:fld id="{91D93EDB-D79D-4870-A6D4-E6A65D35F88E}" type="datetimeFigureOut">
               <a:rPr lang="en-DK" smtClean="0"/>
-              <a:t>04/11/2024</a:t>
+              <a:t>11/5/24</a:t>
             </a:fld>
             <a:endParaRPr lang="en-DK"/>
           </a:p>
@@ -1821,7 +1821,7 @@
           <a:p>
             <a:fld id="{91D93EDB-D79D-4870-A6D4-E6A65D35F88E}" type="datetimeFigureOut">
               <a:rPr lang="en-DK" smtClean="0"/>
-              <a:t>04/11/2024</a:t>
+              <a:t>11/5/24</a:t>
             </a:fld>
             <a:endParaRPr lang="en-DK"/>
           </a:p>
@@ -2098,7 +2098,7 @@
           <a:p>
             <a:fld id="{91D93EDB-D79D-4870-A6D4-E6A65D35F88E}" type="datetimeFigureOut">
               <a:rPr lang="en-DK" smtClean="0"/>
-              <a:t>04/11/2024</a:t>
+              <a:t>11/5/24</a:t>
             </a:fld>
             <a:endParaRPr lang="en-DK"/>
           </a:p>
@@ -2355,7 +2355,7 @@
           <a:p>
             <a:fld id="{91D93EDB-D79D-4870-A6D4-E6A65D35F88E}" type="datetimeFigureOut">
               <a:rPr lang="en-DK" smtClean="0"/>
-              <a:t>04/11/2024</a:t>
+              <a:t>11/5/24</a:t>
             </a:fld>
             <a:endParaRPr lang="en-DK"/>
           </a:p>
@@ -2568,7 +2568,7 @@
           <a:p>
             <a:fld id="{91D93EDB-D79D-4870-A6D4-E6A65D35F88E}" type="datetimeFigureOut">
               <a:rPr lang="en-DK" smtClean="0"/>
-              <a:t>04/11/2024</a:t>
+              <a:t>11/5/24</a:t>
             </a:fld>
             <a:endParaRPr lang="en-DK"/>
           </a:p>
@@ -2987,8 +2987,8 @@
         </p:nvSpPr>
         <p:spPr>
           <a:xfrm>
-            <a:off x="1026659" y="16230883"/>
-            <a:ext cx="28186970" cy="8425732"/>
+            <a:off x="1026659" y="16844275"/>
+            <a:ext cx="28186970" cy="7812339"/>
           </a:xfrm>
           <a:prstGeom prst="roundRect">
             <a:avLst/>
@@ -3023,7 +3023,7 @@
           <a:lstStyle/>
           <a:p>
             <a:pPr algn="ctr"/>
-            <a:endParaRPr lang="en-DK"/>
+            <a:endParaRPr lang="en-CA" dirty="0"/>
           </a:p>
         </p:txBody>
       </p:sp>
@@ -3041,8 +3041,8 @@
         </p:nvSpPr>
         <p:spPr>
           <a:xfrm>
-            <a:off x="1026658" y="35808094"/>
-            <a:ext cx="19291494" cy="5826490"/>
+            <a:off x="992219" y="35254974"/>
+            <a:ext cx="19291494" cy="6481209"/>
           </a:xfrm>
           <a:prstGeom prst="roundRect">
             <a:avLst/>
@@ -3077,7 +3077,7 @@
           <a:lstStyle/>
           <a:p>
             <a:pPr algn="ctr"/>
-            <a:endParaRPr lang="en-DK"/>
+            <a:endParaRPr lang="en-CA" dirty="0"/>
           </a:p>
         </p:txBody>
       </p:sp>
@@ -3096,7 +3096,7 @@
         <p:spPr>
           <a:xfrm>
             <a:off x="1026658" y="25314121"/>
-            <a:ext cx="28706181" cy="10119098"/>
+            <a:ext cx="28706181" cy="9310660"/>
           </a:xfrm>
           <a:prstGeom prst="roundRect">
             <a:avLst/>
@@ -3131,7 +3131,7 @@
           <a:lstStyle/>
           <a:p>
             <a:pPr algn="ctr"/>
-            <a:endParaRPr lang="en-DK" dirty="0"/>
+            <a:endParaRPr lang="en-CA" dirty="0"/>
           </a:p>
         </p:txBody>
       </p:sp>
@@ -3150,7 +3150,7 @@
         <p:spPr>
           <a:xfrm>
             <a:off x="1026659" y="11026491"/>
-            <a:ext cx="28186970" cy="4485380"/>
+            <a:ext cx="28186970" cy="5004202"/>
           </a:xfrm>
           <a:prstGeom prst="roundRect">
             <a:avLst/>
@@ -3185,7 +3185,7 @@
           <a:lstStyle/>
           <a:p>
             <a:pPr algn="ctr"/>
-            <a:endParaRPr lang="en-DK"/>
+            <a:endParaRPr lang="en-CA" dirty="0"/>
           </a:p>
         </p:txBody>
       </p:sp>
@@ -3240,7 +3240,7 @@
           <a:p>
             <a:pPr algn="ctr"/>
             <a:r>
-              <a:rPr lang="en-GB" sz="7200" b="1" dirty="0">
+              <a:rPr lang="en-CA" sz="7200" b="1" dirty="0">
                 <a:solidFill>
                   <a:schemeClr val="tx1"/>
                 </a:solidFill>
@@ -3251,7 +3251,7 @@
           <a:p>
             <a:pPr algn="ctr"/>
             <a:r>
-              <a:rPr lang="fr-FR" sz="7200" dirty="0">
+              <a:rPr lang="en-CA" sz="7200" dirty="0">
                 <a:solidFill>
                   <a:schemeClr val="tx1"/>
                 </a:solidFill>
@@ -3259,7 +3259,7 @@
               </a:rPr>
               <a:t>https://openneuropet.github.io/</a:t>
             </a:r>
-            <a:endParaRPr lang="en-DK" sz="7200" dirty="0">
+            <a:endParaRPr lang="en-CA" sz="7200" dirty="0">
               <a:solidFill>
                 <a:schemeClr val="tx1"/>
               </a:solidFill>
@@ -3332,468 +3332,299 @@
           <a:lstStyle/>
           <a:p>
             <a:r>
-              <a:rPr lang="fr-FR" sz="4400" b="1" dirty="0"/>
+              <a:rPr lang="en-CA" sz="4400" b="1" dirty="0"/>
               <a:t>Cyril Pernet</a:t>
             </a:r>
             <a:r>
-              <a:rPr lang="fr-FR" sz="4400" b="1" baseline="30000" dirty="0"/>
+              <a:rPr lang="en-CA" sz="4400" b="1" baseline="30000" dirty="0"/>
               <a:t>1</a:t>
             </a:r>
             <a:r>
-              <a:rPr lang="fr-FR" sz="4400" b="1" dirty="0"/>
+              <a:rPr lang="en-CA" sz="4400" b="1" dirty="0"/>
               <a:t> , Anthony Galassi</a:t>
             </a:r>
             <a:r>
-              <a:rPr lang="fr-FR" sz="4400" b="1" baseline="30000" dirty="0"/>
+              <a:rPr lang="en-CA" sz="4400" b="1" baseline="30000" dirty="0"/>
               <a:t>2</a:t>
             </a:r>
             <a:r>
-              <a:rPr lang="fr-FR" sz="4400" b="1" dirty="0"/>
-              <a:t>, </a:t>
-            </a:r>
-            <a:r>
-              <a:rPr lang="fr-FR" sz="4400" b="1"/>
-              <a:t>Martin Norgaard</a:t>
-            </a:r>
-            <a:r>
-              <a:rPr lang="fr-FR" sz="4400" b="1" baseline="30000"/>
+              <a:rPr lang="en-CA" sz="4400" b="1" dirty="0"/>
+              <a:t>, Martin Norgaard</a:t>
+            </a:r>
+            <a:r>
+              <a:rPr lang="en-CA" sz="4400" b="1" baseline="30000" dirty="0"/>
               <a:t>2,3</a:t>
             </a:r>
             <a:r>
-              <a:rPr lang="fr-FR" sz="4400" b="1"/>
-              <a:t>, </a:t>
-            </a:r>
-            <a:r>
-              <a:rPr lang="fr-FR" sz="4400" b="1" dirty="0"/>
-              <a:t>Granville J. Matheson</a:t>
-            </a:r>
-            <a:r>
-              <a:rPr lang="fr-FR" sz="4400" b="1" baseline="30000" dirty="0"/>
+              <a:rPr lang="en-CA" sz="4400" b="1" dirty="0"/>
+              <a:t>, Granville J. Matheson</a:t>
+            </a:r>
+            <a:r>
+              <a:rPr lang="en-CA" sz="4400" b="1" baseline="30000" dirty="0"/>
               <a:t>4,5</a:t>
             </a:r>
             <a:r>
-              <a:rPr lang="fr-FR" sz="4400" b="1" dirty="0"/>
-              <a:t>, </a:t>
-            </a:r>
-            <a:r>
-              <a:rPr lang="en-GB" sz="4400" b="1" dirty="0"/>
-              <a:t>Paul Wighton</a:t>
-            </a:r>
-            <a:r>
-              <a:rPr lang="en-GB" sz="4400" b="1" baseline="30000" dirty="0"/>
+              <a:rPr lang="en-CA" sz="4400" b="1" dirty="0"/>
+              <a:t>, Paul Wighton</a:t>
+            </a:r>
+            <a:r>
+              <a:rPr lang="en-CA" sz="4400" b="1" baseline="30000" dirty="0"/>
               <a:t>6</a:t>
             </a:r>
             <a:r>
-              <a:rPr lang="en-GB" sz="4400" b="1" dirty="0"/>
-              <a:t>, </a:t>
-            </a:r>
-            <a:r>
-              <a:rPr lang="fr-FR" sz="4400" b="1" dirty="0"/>
-              <a:t>Adam G. Thomas</a:t>
-            </a:r>
-            <a:r>
-              <a:rPr lang="fr-FR" sz="4400" b="1" baseline="30000" dirty="0"/>
+              <a:rPr lang="en-CA" sz="4400" b="1" dirty="0"/>
+              <a:t>, Adam G. Thomas</a:t>
+            </a:r>
+            <a:r>
+              <a:rPr lang="en-CA" sz="4400" b="1" baseline="30000" dirty="0"/>
               <a:t>2</a:t>
             </a:r>
             <a:r>
-              <a:rPr lang="fr-FR" sz="4400" b="1" dirty="0"/>
+              <a:rPr lang="en-CA" sz="4400" b="1" dirty="0"/>
               <a:t>, Gabriel Gonzalez-Escamilla</a:t>
             </a:r>
             <a:r>
-              <a:rPr lang="fr-FR" sz="4400" b="1" baseline="30000" dirty="0"/>
+              <a:rPr lang="en-CA" sz="4400" b="1" baseline="30000" dirty="0"/>
               <a:t>7</a:t>
             </a:r>
             <a:r>
-              <a:rPr lang="fr-FR" sz="4400" b="1" dirty="0"/>
+              <a:rPr lang="en-CA" sz="4400" b="1" dirty="0"/>
               <a:t>, Cyrus Eierud</a:t>
             </a:r>
             <a:r>
-              <a:rPr lang="fr-FR" sz="4400" b="1" baseline="30000" dirty="0"/>
+              <a:rPr lang="en-CA" sz="4400" b="1" baseline="30000" dirty="0"/>
               <a:t>8</a:t>
             </a:r>
             <a:r>
-              <a:rPr lang="fr-FR" sz="4400" b="1" dirty="0"/>
+              <a:rPr lang="en-CA" sz="4400" b="1" dirty="0"/>
               <a:t>, Murat Bilgel</a:t>
             </a:r>
             <a:r>
-              <a:rPr lang="fr-FR" sz="4400" b="1" baseline="30000" dirty="0"/>
+              <a:rPr lang="en-CA" sz="4400" b="1" baseline="30000" dirty="0"/>
               <a:t>9</a:t>
             </a:r>
             <a:r>
-              <a:rPr lang="fr-FR" sz="4400" b="1" dirty="0"/>
-              <a:t>, </a:t>
-            </a:r>
-            <a:r>
-              <a:rPr lang="fr-FR" sz="4400" b="1" dirty="0" err="1"/>
-              <a:t>Eric</a:t>
-            </a:r>
-            <a:r>
-              <a:rPr lang="fr-FR" sz="4400" b="1" dirty="0"/>
-              <a:t> Ceballos</a:t>
-            </a:r>
-            <a:r>
-              <a:rPr lang="fr-FR" sz="4400" b="1" baseline="30000" dirty="0"/>
+              <a:rPr lang="en-CA" sz="4400" b="1" dirty="0"/>
+              <a:t>, Eric Ceballos</a:t>
+            </a:r>
+            <a:r>
+              <a:rPr lang="en-CA" sz="4400" b="1" baseline="30000" dirty="0"/>
               <a:t>10</a:t>
             </a:r>
             <a:r>
-              <a:rPr lang="fr-FR" sz="4400" b="1" dirty="0"/>
+              <a:rPr lang="en-CA" sz="4400" b="1" dirty="0"/>
               <a:t>, Claus Svarer</a:t>
             </a:r>
             <a:r>
-              <a:rPr lang="fr-FR" sz="4400" b="1" baseline="30000" dirty="0"/>
+              <a:rPr lang="en-CA" sz="4400" b="1" baseline="30000" dirty="0"/>
               <a:t>1</a:t>
             </a:r>
             <a:r>
-              <a:rPr lang="fr-FR" sz="4400" b="1" dirty="0"/>
+              <a:rPr lang="en-CA" sz="4400" b="1" dirty="0"/>
               <a:t>, Chris Rorden</a:t>
             </a:r>
             <a:r>
-              <a:rPr lang="fr-FR" sz="4400" b="1" baseline="30000" dirty="0"/>
+              <a:rPr lang="en-CA" sz="4400" b="1" baseline="30000" dirty="0"/>
               <a:t>11</a:t>
             </a:r>
             <a:r>
-              <a:rPr lang="fr-FR" sz="4400" b="1" dirty="0"/>
-              <a:t>, Vince Calhun</a:t>
-            </a:r>
-            <a:r>
-              <a:rPr lang="fr-FR" sz="4400" b="1" baseline="30000" dirty="0"/>
+              <a:rPr lang="en-CA" sz="4400" b="1" dirty="0"/>
+              <a:t>, Vince Calhoun</a:t>
+            </a:r>
+            <a:r>
+              <a:rPr lang="en-CA" sz="4400" b="1" baseline="30000" dirty="0"/>
               <a:t>8</a:t>
             </a:r>
             <a:r>
-              <a:rPr lang="fr-FR" sz="4400" b="1" dirty="0"/>
-              <a:t>, </a:t>
-            </a:r>
-            <a:r>
-              <a:rPr lang="en-GB" sz="4400" b="1" dirty="0"/>
-              <a:t>Douglas Greeve</a:t>
-            </a:r>
-            <a:r>
-              <a:rPr lang="en-GB" sz="4400" b="1" baseline="30000" dirty="0"/>
+              <a:rPr lang="en-CA" sz="4400" b="1" dirty="0"/>
+              <a:t>, Douglas Greve</a:t>
+            </a:r>
+            <a:r>
+              <a:rPr lang="en-CA" sz="4400" b="1" baseline="30000" dirty="0"/>
               <a:t>6</a:t>
             </a:r>
             <a:r>
-              <a:rPr lang="en-GB" sz="4400" b="1" dirty="0"/>
-              <a:t>, </a:t>
-            </a:r>
-            <a:r>
-              <a:rPr lang="fr-FR" sz="4400" b="1" dirty="0"/>
-              <a:t>Russel Poldrack</a:t>
-            </a:r>
-            <a:r>
-              <a:rPr lang="fr-FR" sz="4400" b="1" baseline="30000" dirty="0"/>
+              <a:rPr lang="en-CA" sz="4400" b="1" dirty="0"/>
+              <a:t>, Russell Poldrack</a:t>
+            </a:r>
+            <a:r>
+              <a:rPr lang="en-CA" sz="4400" b="1" baseline="30000" dirty="0"/>
               <a:t>12</a:t>
             </a:r>
             <a:r>
-              <a:rPr lang="fr-FR" sz="4400" b="1" dirty="0"/>
+              <a:rPr lang="en-CA" sz="4400" b="1" dirty="0"/>
               <a:t>, Melanie Ganz</a:t>
             </a:r>
             <a:r>
-              <a:rPr lang="fr-FR" sz="4400" b="1" baseline="30000" dirty="0"/>
+              <a:rPr lang="en-CA" sz="4400" b="1" baseline="30000" dirty="0"/>
               <a:t>1,3</a:t>
             </a:r>
             <a:r>
-              <a:rPr lang="fr-FR" sz="4400" b="1" dirty="0"/>
+              <a:rPr lang="en-CA" sz="4400" b="1" dirty="0"/>
               <a:t>, Robert B. Innis</a:t>
             </a:r>
             <a:r>
-              <a:rPr lang="fr-FR" sz="4400" b="1" baseline="30000" dirty="0"/>
+              <a:rPr lang="en-CA" sz="4400" b="1" baseline="30000" dirty="0"/>
               <a:t>2</a:t>
             </a:r>
             <a:r>
-              <a:rPr lang="fr-FR" sz="4400" b="1" dirty="0"/>
+              <a:rPr lang="en-CA" sz="4400" b="1" dirty="0"/>
               <a:t> &amp; Gitte M. Knudsen</a:t>
             </a:r>
             <a:r>
-              <a:rPr lang="fr-FR" sz="4400" b="1" baseline="30000" dirty="0"/>
+              <a:rPr lang="en-CA" sz="4400" b="1" baseline="30000" dirty="0"/>
               <a:t>1</a:t>
             </a:r>
-            <a:endParaRPr lang="fr-FR" sz="4400" b="1" dirty="0"/>
-          </a:p>
-          <a:p>
-            <a:endParaRPr lang="fr-FR" sz="4400" dirty="0"/>
-          </a:p>
-          <a:p>
-            <a:r>
-              <a:rPr lang="fr-FR" sz="4400" baseline="30000" dirty="0"/>
+            <a:endParaRPr lang="en-CA" sz="4400" b="1" dirty="0"/>
+          </a:p>
+          <a:p>
+            <a:endParaRPr lang="en-CA" sz="4400" dirty="0"/>
+          </a:p>
+          <a:p>
+            <a:r>
+              <a:rPr lang="en-CA" sz="4400" baseline="30000" dirty="0"/>
               <a:t>1</a:t>
             </a:r>
             <a:r>
-              <a:rPr lang="fr-FR" sz="4400" dirty="0"/>
+              <a:rPr lang="en-CA" sz="4400" dirty="0"/>
+              <a:t> Neurobiology Research Unit, Copenhagen, Denmark </a:t>
+            </a:r>
+            <a:r>
+              <a:rPr lang="en-CA" sz="4400" baseline="30000" dirty="0"/>
+              <a:t>2</a:t>
+            </a:r>
+            <a:r>
+              <a:rPr lang="en-CA" sz="4400" dirty="0"/>
+              <a:t> NIH, Bethesda, USA </a:t>
+            </a:r>
+            <a:r>
+              <a:rPr lang="en-CA" sz="4400" baseline="30000" dirty="0"/>
+              <a:t>3</a:t>
+            </a:r>
+            <a:r>
+              <a:rPr lang="en-CA" sz="4400" dirty="0"/>
               <a:t> </a:t>
             </a:r>
             <a:r>
-              <a:rPr lang="fr-FR" sz="4400" dirty="0" err="1"/>
-              <a:t>Neurobiology</a:t>
-            </a:r>
-            <a:r>
-              <a:rPr lang="fr-FR" sz="4400" dirty="0"/>
-              <a:t> Research Unit, </a:t>
-            </a:r>
-            <a:r>
-              <a:rPr lang="fr-FR" sz="4400" dirty="0" err="1"/>
-              <a:t>Copenhagen</a:t>
-            </a:r>
-            <a:r>
-              <a:rPr lang="fr-FR" sz="4400" dirty="0"/>
-              <a:t>, </a:t>
-            </a:r>
-            <a:r>
-              <a:rPr lang="fr-FR" sz="4400" dirty="0" err="1"/>
-              <a:t>Denmark</a:t>
-            </a:r>
-            <a:r>
-              <a:rPr lang="fr-FR" sz="4400" dirty="0"/>
+              <a:rPr lang="en-CA" sz="4400" dirty="0" err="1"/>
+              <a:t>Dpt</a:t>
+            </a:r>
+            <a:r>
+              <a:rPr lang="en-CA" sz="4400" dirty="0"/>
+              <a:t> of Computer Science, University of Copenhagen </a:t>
+            </a:r>
+            <a:r>
+              <a:rPr lang="en-CA" sz="4400" baseline="30000" dirty="0"/>
+              <a:t>4</a:t>
+            </a:r>
+            <a:r>
+              <a:rPr lang="en-CA" sz="4400" dirty="0"/>
               <a:t> </a:t>
             </a:r>
             <a:r>
-              <a:rPr lang="fr-FR" sz="4400" baseline="30000" dirty="0"/>
-              <a:t>2</a:t>
-            </a:r>
-            <a:r>
-              <a:rPr lang="fr-FR" sz="4400" dirty="0"/>
-              <a:t> NIH, Bethesda, USA </a:t>
-            </a:r>
-            <a:r>
-              <a:rPr lang="fr-FR" sz="4400" baseline="30000" dirty="0"/>
-              <a:t>3</a:t>
-            </a:r>
-            <a:r>
-              <a:rPr lang="fr-FR" sz="4400" dirty="0"/>
-              <a:t> Dpt of Computer Science, </a:t>
-            </a:r>
-            <a:r>
-              <a:rPr lang="fr-FR" sz="4400" dirty="0" err="1"/>
-              <a:t>University</a:t>
-            </a:r>
-            <a:r>
-              <a:rPr lang="fr-FR" sz="4400" dirty="0"/>
-              <a:t> of </a:t>
-            </a:r>
-            <a:r>
-              <a:rPr lang="fr-FR" sz="4400" dirty="0" err="1"/>
-              <a:t>Copenhagen</a:t>
-            </a:r>
-            <a:r>
-              <a:rPr lang="fr-FR" sz="4400" dirty="0"/>
+              <a:rPr lang="en-CA" sz="4400" dirty="0" err="1"/>
+              <a:t>Dpt</a:t>
+            </a:r>
+            <a:r>
+              <a:rPr lang="en-CA" sz="4400" dirty="0"/>
+              <a:t> of Clinical Neuroscience, Karolinska </a:t>
+            </a:r>
+            <a:r>
+              <a:rPr lang="en-CA" sz="4400" dirty="0" err="1"/>
+              <a:t>Institutet</a:t>
+            </a:r>
+            <a:r>
+              <a:rPr lang="en-CA" sz="4400" dirty="0"/>
+              <a:t>, Stockholm, Sweden </a:t>
+            </a:r>
+            <a:r>
+              <a:rPr lang="en-CA" sz="4400" baseline="30000" dirty="0"/>
+              <a:t>5</a:t>
+            </a:r>
+            <a:r>
+              <a:rPr lang="en-CA" sz="4400" dirty="0"/>
+              <a:t> Mailman school of Public Health, Columbia University, NY, USA </a:t>
+            </a:r>
+            <a:r>
+              <a:rPr lang="en-CA" sz="4400" baseline="30000" dirty="0"/>
+              <a:t>6</a:t>
+            </a:r>
+            <a:r>
+              <a:rPr lang="en-CA" sz="4400" dirty="0"/>
+              <a:t> Martinos Centre, MGH, USA  </a:t>
+            </a:r>
+            <a:r>
+              <a:rPr lang="en-CA" sz="4400" baseline="30000" dirty="0"/>
+              <a:t>7</a:t>
+            </a:r>
+            <a:r>
+              <a:rPr lang="en-CA" sz="4400" dirty="0"/>
+              <a:t> University Medical Center of the Johannes Gutenberg University Mainz, Germany </a:t>
+            </a:r>
+            <a:r>
+              <a:rPr lang="en-CA" sz="4400" baseline="30000" dirty="0"/>
+              <a:t>8</a:t>
+            </a:r>
+            <a:r>
+              <a:rPr lang="en-CA" sz="4400" dirty="0"/>
               <a:t> </a:t>
             </a:r>
             <a:r>
-              <a:rPr lang="fr-FR" sz="4400" baseline="30000" dirty="0"/>
-              <a:t>4</a:t>
-            </a:r>
-            <a:r>
-              <a:rPr lang="fr-FR" sz="4400" dirty="0"/>
-              <a:t> Dpt of Clinical Neuroscience, </a:t>
-            </a:r>
-            <a:r>
-              <a:rPr lang="fr-FR" sz="4400" dirty="0" err="1"/>
-              <a:t>Karolinska</a:t>
-            </a:r>
-            <a:r>
-              <a:rPr lang="fr-FR" sz="4400" dirty="0"/>
+              <a:rPr lang="en-CA" sz="4400" dirty="0" err="1"/>
+              <a:t>TReNDS</a:t>
+            </a:r>
+            <a:r>
+              <a:rPr lang="en-CA" sz="4400" dirty="0"/>
+              <a:t> Center, Georgia State University, Atlanta, USA </a:t>
+            </a:r>
+            <a:r>
+              <a:rPr lang="en-CA" sz="4400" baseline="30000" dirty="0"/>
+              <a:t>9</a:t>
+            </a:r>
+            <a:r>
+              <a:rPr lang="en-CA" sz="4400" dirty="0"/>
+              <a:t> National Institute on Aging Intramural Research Program, Baltimore, USA </a:t>
+            </a:r>
+            <a:r>
+              <a:rPr lang="en-CA" sz="4400" baseline="30000" dirty="0"/>
+              <a:t>10</a:t>
+            </a:r>
+            <a:r>
+              <a:rPr lang="en-CA" sz="4400" dirty="0"/>
+              <a:t> McGill University, Canada </a:t>
+            </a:r>
+            <a:r>
+              <a:rPr lang="en-CA" sz="4400" baseline="30000" dirty="0"/>
+              <a:t>11</a:t>
+            </a:r>
+            <a:r>
+              <a:rPr lang="en-CA" sz="4400" dirty="0"/>
               <a:t> </a:t>
             </a:r>
             <a:r>
-              <a:rPr lang="fr-FR" sz="4400" dirty="0" err="1"/>
-              <a:t>Institutet</a:t>
-            </a:r>
-            <a:r>
-              <a:rPr lang="fr-FR" sz="4400" dirty="0"/>
-              <a:t>, Stockholm, </a:t>
-            </a:r>
-            <a:r>
-              <a:rPr lang="fr-FR" sz="4400" dirty="0" err="1"/>
-              <a:t>Sweden</a:t>
-            </a:r>
-            <a:r>
-              <a:rPr lang="fr-FR" sz="4400" dirty="0"/>
+              <a:rPr lang="en-CA" sz="4400" dirty="0" err="1"/>
+              <a:t>Dpt</a:t>
+            </a:r>
+            <a:r>
+              <a:rPr lang="en-CA" sz="4400" dirty="0"/>
+              <a:t> of Psychology, University of South Carolina, USA </a:t>
+            </a:r>
+            <a:r>
+              <a:rPr lang="en-CA" sz="4400" baseline="30000" dirty="0"/>
+              <a:t>12</a:t>
+            </a:r>
+            <a:r>
+              <a:rPr lang="en-CA" sz="4400" dirty="0"/>
               <a:t> </a:t>
             </a:r>
             <a:r>
-              <a:rPr lang="fr-FR" sz="4400" baseline="30000" dirty="0"/>
-              <a:t>5</a:t>
-            </a:r>
-            <a:r>
-              <a:rPr lang="fr-FR" sz="4400" dirty="0"/>
-              <a:t> </a:t>
-            </a:r>
-            <a:r>
-              <a:rPr lang="fr-FR" sz="4400" dirty="0" err="1"/>
-              <a:t>Mailman</a:t>
-            </a:r>
-            <a:r>
-              <a:rPr lang="fr-FR" sz="4400" dirty="0"/>
-              <a:t> </a:t>
-            </a:r>
-            <a:r>
-              <a:rPr lang="fr-FR" sz="4400" dirty="0" err="1"/>
-              <a:t>school</a:t>
-            </a:r>
-            <a:r>
-              <a:rPr lang="fr-FR" sz="4400" dirty="0"/>
-              <a:t> of Public </a:t>
-            </a:r>
-            <a:r>
-              <a:rPr lang="fr-FR" sz="4400" dirty="0" err="1"/>
-              <a:t>Health</a:t>
-            </a:r>
-            <a:r>
-              <a:rPr lang="fr-FR" sz="4400" dirty="0"/>
-              <a:t>, Columbia </a:t>
-            </a:r>
-            <a:r>
-              <a:rPr lang="fr-FR" sz="4400" dirty="0" err="1"/>
-              <a:t>University</a:t>
-            </a:r>
-            <a:r>
-              <a:rPr lang="fr-FR" sz="4400" dirty="0"/>
-              <a:t>, NY, USA </a:t>
-            </a:r>
-            <a:r>
-              <a:rPr lang="fr-FR" sz="4400" baseline="30000" dirty="0"/>
-              <a:t>6</a:t>
-            </a:r>
-            <a:r>
-              <a:rPr lang="fr-FR" sz="4400" dirty="0"/>
-              <a:t> </a:t>
-            </a:r>
-            <a:r>
-              <a:rPr lang="fr-FR" sz="4400" dirty="0" err="1"/>
-              <a:t>Martinos</a:t>
-            </a:r>
-            <a:r>
-              <a:rPr lang="fr-FR" sz="4400" dirty="0"/>
-              <a:t> Centre, MGH, USA  </a:t>
-            </a:r>
-            <a:r>
-              <a:rPr lang="fr-FR" sz="4400" baseline="30000" dirty="0"/>
-              <a:t>7</a:t>
-            </a:r>
-            <a:r>
-              <a:rPr lang="fr-FR" sz="4400" dirty="0"/>
-              <a:t> </a:t>
-            </a:r>
-            <a:r>
-              <a:rPr lang="fr-FR" sz="4400" dirty="0" err="1"/>
-              <a:t>University</a:t>
-            </a:r>
-            <a:r>
-              <a:rPr lang="fr-FR" sz="4400" dirty="0"/>
-              <a:t> </a:t>
-            </a:r>
-            <a:r>
-              <a:rPr lang="fr-FR" sz="4400" dirty="0" err="1"/>
-              <a:t>Medical</a:t>
-            </a:r>
-            <a:r>
-              <a:rPr lang="fr-FR" sz="4400" dirty="0"/>
-              <a:t> Center of the Johannes Gutenberg </a:t>
-            </a:r>
-            <a:r>
-              <a:rPr lang="fr-FR" sz="4400" dirty="0" err="1"/>
-              <a:t>University</a:t>
-            </a:r>
-            <a:r>
-              <a:rPr lang="fr-FR" sz="4400" dirty="0"/>
-              <a:t> Mainz, Germany </a:t>
-            </a:r>
-            <a:r>
-              <a:rPr lang="fr-FR" sz="4400" baseline="30000" dirty="0"/>
-              <a:t>8</a:t>
-            </a:r>
-            <a:r>
-              <a:rPr lang="fr-FR" sz="4400" dirty="0"/>
-              <a:t> </a:t>
-            </a:r>
-            <a:r>
-              <a:rPr lang="fr-FR" sz="4400" dirty="0" err="1"/>
-              <a:t>TReNDS</a:t>
-            </a:r>
-            <a:r>
-              <a:rPr lang="fr-FR" sz="4400" dirty="0"/>
-              <a:t> Center, Georgia State </a:t>
-            </a:r>
-            <a:r>
-              <a:rPr lang="fr-FR" sz="4400" dirty="0" err="1"/>
-              <a:t>University</a:t>
-            </a:r>
-            <a:r>
-              <a:rPr lang="fr-FR" sz="4400" dirty="0"/>
-              <a:t>, Atlanta, USA </a:t>
-            </a:r>
-            <a:r>
-              <a:rPr lang="fr-FR" sz="4400" baseline="30000" dirty="0"/>
-              <a:t>9</a:t>
-            </a:r>
-            <a:r>
-              <a:rPr lang="fr-FR" sz="4400" dirty="0"/>
-              <a:t> National Institute on </a:t>
-            </a:r>
-            <a:r>
-              <a:rPr lang="fr-FR" sz="4400" dirty="0" err="1"/>
-              <a:t>Aging</a:t>
-            </a:r>
-            <a:r>
-              <a:rPr lang="fr-FR" sz="4400" dirty="0"/>
-              <a:t> </a:t>
-            </a:r>
-            <a:r>
-              <a:rPr lang="fr-FR" sz="4400" dirty="0" err="1"/>
-              <a:t>Intramural</a:t>
-            </a:r>
-            <a:r>
-              <a:rPr lang="fr-FR" sz="4400" dirty="0"/>
-              <a:t> Research Program, Baltimore, USA </a:t>
-            </a:r>
-            <a:r>
-              <a:rPr lang="fr-FR" sz="4400" baseline="30000" dirty="0"/>
-              <a:t>10</a:t>
-            </a:r>
-            <a:r>
-              <a:rPr lang="fr-FR" sz="4400" dirty="0"/>
-              <a:t> McGill </a:t>
-            </a:r>
-            <a:r>
-              <a:rPr lang="fr-FR" sz="4400" dirty="0" err="1"/>
-              <a:t>University</a:t>
-            </a:r>
-            <a:r>
-              <a:rPr lang="fr-FR" sz="4400" dirty="0"/>
-              <a:t>, Canada </a:t>
-            </a:r>
-            <a:r>
-              <a:rPr lang="fr-FR" sz="4400" baseline="30000" dirty="0"/>
-              <a:t>11</a:t>
-            </a:r>
-            <a:r>
-              <a:rPr lang="fr-FR" sz="4400" dirty="0"/>
-              <a:t> Dpt of Psychology, </a:t>
-            </a:r>
-            <a:r>
-              <a:rPr lang="fr-FR" sz="4400" dirty="0" err="1"/>
-              <a:t>University</a:t>
-            </a:r>
-            <a:r>
-              <a:rPr lang="fr-FR" sz="4400" dirty="0"/>
-              <a:t> of South Carolina, USA </a:t>
-            </a:r>
-            <a:r>
-              <a:rPr lang="fr-FR" sz="4400" baseline="30000" dirty="0"/>
-              <a:t>12</a:t>
-            </a:r>
-            <a:r>
-              <a:rPr lang="fr-FR" sz="4400" dirty="0"/>
-              <a:t> Dpt of Psychology, Stanford </a:t>
-            </a:r>
-            <a:r>
-              <a:rPr lang="fr-FR" sz="4400" dirty="0" err="1"/>
-              <a:t>University</a:t>
-            </a:r>
-            <a:r>
-              <a:rPr lang="fr-FR" sz="4400" dirty="0"/>
-              <a:t>, USA.</a:t>
-            </a:r>
-            <a:endParaRPr lang="en-DK" sz="4400" dirty="0"/>
+              <a:rPr lang="en-CA" sz="4400" dirty="0" err="1"/>
+              <a:t>Dpt</a:t>
+            </a:r>
+            <a:r>
+              <a:rPr lang="en-CA" sz="4400" dirty="0"/>
+              <a:t> of Psychology, Stanford University, USA.</a:t>
+            </a:r>
           </a:p>
         </p:txBody>
       </p:sp>
@@ -3811,8 +3642,8 @@
         </p:nvSpPr>
         <p:spPr>
           <a:xfrm>
-            <a:off x="1532699" y="11816991"/>
-            <a:ext cx="27242513" cy="3046988"/>
+            <a:off x="1532699" y="11329159"/>
+            <a:ext cx="27242513" cy="4524315"/>
           </a:xfrm>
           <a:prstGeom prst="rect">
             <a:avLst/>
@@ -3827,22 +3658,21 @@
           <a:p>
             <a:pPr algn="just"/>
             <a:r>
-              <a:rPr lang="en-GB" sz="4800" b="1" u="sng" dirty="0"/>
-              <a:t>Background</a:t>
-            </a:r>
-            <a:r>
-              <a:rPr lang="en-GB" sz="4800" dirty="0"/>
+              <a:rPr lang="en-CA" sz="4800" b="1" u="sng" dirty="0"/>
+              <a:t>Abstract</a:t>
+            </a:r>
+            <a:r>
+              <a:rPr lang="en-CA" sz="4800" dirty="0"/>
               <a:t>: Reproducibility is a cornerstone of science, and one factor contributing to improving reproducibility is openness, from raw data to publication. </a:t>
             </a:r>
             <a:r>
-              <a:rPr lang="en-GB" sz="4800" dirty="0" err="1"/>
+              <a:rPr lang="en-CA" sz="4800" dirty="0" err="1"/>
               <a:t>OpenNeuroPET</a:t>
             </a:r>
             <a:r>
-              <a:rPr lang="en-GB" sz="4800" dirty="0"/>
-              <a:t> is a project primarily driven by NIMH (Prof Innis) and the NRU (Prof Knudsen), assembling a team of experts in PET analyses and data science, providing a set of tools and solutions to take brain PET at the forefront of open neuroimaging.</a:t>
-            </a:r>
-            <a:endParaRPr lang="en-DK" sz="4800" dirty="0"/>
+              <a:rPr lang="en-CA" sz="4800" dirty="0"/>
+              <a:t> (ONP) is a project primarily driven by NIMH (Prof Innis) and the NRU (Prof Knudsen) to develop standardized tools that facilitate seamless conversion and processing of Positron Emission Tomography (PET) data from raw to publication-ready format. ONP also provides a data sharing base where researchers can access PET datasets as well as group templates in the form of molecular atlases.</a:t>
+            </a:r>
           </a:p>
         </p:txBody>
       </p:sp>
@@ -4030,10 +3860,9 @@
           <a:lstStyle/>
           <a:p>
             <a:r>
-              <a:rPr lang="da-DK" sz="4800" b="1" u="sng" dirty="0"/>
+              <a:rPr lang="en-CA" sz="4800" b="1" u="sng" dirty="0"/>
               <a:t>Funding</a:t>
             </a:r>
-            <a:endParaRPr lang="en-DK" sz="4800" b="1" u="sng" dirty="0"/>
           </a:p>
         </p:txBody>
       </p:sp>
@@ -4051,8 +3880,8 @@
         </p:nvSpPr>
         <p:spPr>
           <a:xfrm>
-            <a:off x="3310699" y="21278198"/>
-            <a:ext cx="10032298" cy="3046988"/>
+            <a:off x="1532698" y="21278198"/>
+            <a:ext cx="15267647" cy="3046988"/>
           </a:xfrm>
           <a:prstGeom prst="rect">
             <a:avLst/>
@@ -4060,13 +3889,13 @@
           <a:noFill/>
         </p:spPr>
         <p:txBody>
-          <a:bodyPr wrap="none" rtlCol="0">
+          <a:bodyPr wrap="square" rtlCol="0">
             <a:spAutoFit/>
           </a:bodyPr>
           <a:lstStyle/>
           <a:p>
             <a:r>
-              <a:rPr lang="da-DK" sz="4800" b="1" u="sng" dirty="0"/>
+              <a:rPr lang="en-CA" sz="4800" b="1" u="sng" dirty="0"/>
               <a:t>Data Sharing</a:t>
             </a:r>
           </a:p>
@@ -4076,8 +3905,8 @@
               <a:buChar char="-"/>
             </a:pPr>
             <a:r>
-              <a:rPr lang="da-DK" sz="4800" dirty="0"/>
-              <a:t>Openly with OpenNeuro</a:t>
+              <a:rPr lang="en-CA" sz="4800" dirty="0"/>
+              <a:t>OpenNeuro for open-access to PET datasets</a:t>
             </a:r>
           </a:p>
           <a:p>
@@ -4086,14 +3915,14 @@
               <a:buChar char="-"/>
             </a:pPr>
             <a:r>
-              <a:rPr lang="da-DK" sz="4800" dirty="0"/>
-              <a:t>Publicly with PublicNeuro</a:t>
-            </a:r>
-          </a:p>
-          <a:p>
-            <a:r>
-              <a:rPr lang="da-DK" sz="4800" dirty="0"/>
-              <a:t>      (open meta but controlled access)</a:t>
+              <a:rPr lang="en-CA" sz="4800" dirty="0"/>
+              <a:t>PublicNeuro for GPDR-conform access to data</a:t>
+            </a:r>
+          </a:p>
+          <a:p>
+            <a:r>
+              <a:rPr lang="en-CA" sz="4800" dirty="0"/>
+              <a:t>      (open metadata but controlled access)</a:t>
             </a:r>
           </a:p>
         </p:txBody>
@@ -4127,7 +3956,7 @@
           <a:lstStyle/>
           <a:p>
             <a:r>
-              <a:rPr lang="da-DK" sz="4800" b="1" u="sng" dirty="0"/>
+              <a:rPr lang="en-CA" sz="4800" b="1" u="sng" dirty="0"/>
               <a:t>Data Standard</a:t>
             </a:r>
           </a:p>
@@ -4137,7 +3966,7 @@
               <a:buChar char="-"/>
             </a:pPr>
             <a:r>
-              <a:rPr lang="da-DK" sz="4800" dirty="0"/>
+              <a:rPr lang="en-CA" sz="4800" dirty="0"/>
               <a:t>BIDS specification (raw and derivatives)</a:t>
             </a:r>
           </a:p>
@@ -4147,16 +3976,16 @@
               <a:buChar char="-"/>
             </a:pPr>
             <a:r>
-              <a:rPr lang="da-DK" sz="4800" dirty="0"/>
+              <a:rPr lang="en-CA" sz="4800" dirty="0"/>
               <a:t>PET2BIDS (conversion tool) </a:t>
             </a:r>
             <a:r>
-              <a:rPr lang="da-DK" sz="4800" dirty="0">
+              <a:rPr lang="en-CA" sz="4800" dirty="0">
                 <a:hlinkClick r:id="rId8"/>
               </a:rPr>
               <a:t>https://github.com/openneuropet/PET2BIDS</a:t>
             </a:r>
-            <a:endParaRPr lang="da-DK" sz="4800" dirty="0"/>
+            <a:endParaRPr lang="en-CA" sz="4800" dirty="0"/>
           </a:p>
           <a:p>
             <a:pPr marL="685800" indent="-685800">
@@ -4164,7 +3993,7 @@
               <a:buChar char="-"/>
             </a:pPr>
             <a:r>
-              <a:rPr lang="da-DK" sz="4800" dirty="0"/>
+              <a:rPr lang="en-CA" sz="4800" dirty="0"/>
               <a:t>Reporting and publication </a:t>
             </a:r>
           </a:p>
@@ -4199,12 +4028,12 @@
           <a:lstStyle/>
           <a:p>
             <a:r>
-              <a:rPr lang="en-DK" sz="4400" dirty="0">
+              <a:rPr lang="en-CA" sz="4400" dirty="0">
                 <a:hlinkClick r:id="rId9"/>
               </a:rPr>
               <a:t>https://publicneuro.eu</a:t>
             </a:r>
-            <a:endParaRPr lang="en-DK" sz="4400" dirty="0"/>
+            <a:endParaRPr lang="en-CA" sz="4400" dirty="0"/>
           </a:p>
         </p:txBody>
       </p:sp>
@@ -4237,12 +4066,12 @@
           <a:lstStyle/>
           <a:p>
             <a:r>
-              <a:rPr lang="en-DK" sz="4000" dirty="0">
+              <a:rPr lang="en-CA" sz="4000" dirty="0">
                 <a:hlinkClick r:id="rId10"/>
               </a:rPr>
               <a:t>https://openneuro.org</a:t>
             </a:r>
-            <a:endParaRPr lang="da-DK" sz="4000" dirty="0"/>
+            <a:endParaRPr lang="en-CA" sz="4000" dirty="0"/>
           </a:p>
         </p:txBody>
       </p:sp>
@@ -4275,12 +4104,12 @@
           <a:lstStyle/>
           <a:p>
             <a:r>
-              <a:rPr lang="en-DK" sz="3600" dirty="0">
+              <a:rPr lang="en-CA" sz="3600" dirty="0">
                 <a:hlinkClick r:id="rId11"/>
               </a:rPr>
               <a:t>https://bids.neuroimaging.io</a:t>
             </a:r>
-            <a:endParaRPr lang="en-DK" sz="3600" dirty="0"/>
+            <a:endParaRPr lang="en-CA" sz="3600" dirty="0"/>
           </a:p>
         </p:txBody>
       </p:sp>
@@ -4298,8 +4127,8 @@
         </p:nvSpPr>
         <p:spPr>
           <a:xfrm>
-            <a:off x="1591065" y="25842715"/>
-            <a:ext cx="26542683" cy="3046988"/>
+            <a:off x="1532699" y="25842715"/>
+            <a:ext cx="4620817" cy="830997"/>
           </a:xfrm>
           <a:prstGeom prst="rect">
             <a:avLst/>
@@ -4307,44 +4136,14 @@
           <a:noFill/>
         </p:spPr>
         <p:txBody>
-          <a:bodyPr wrap="square" rtlCol="0">
+          <a:bodyPr wrap="none" rtlCol="0">
             <a:spAutoFit/>
           </a:bodyPr>
           <a:lstStyle/>
           <a:p>
             <a:r>
-              <a:rPr lang="da-DK" sz="4800" b="1" u="sng" dirty="0"/>
-              <a:t>Data Worklfows</a:t>
-            </a:r>
-          </a:p>
-          <a:p>
-            <a:pPr marL="685800" indent="-685800">
-              <a:buFontTx/>
-              <a:buChar char="-"/>
-            </a:pPr>
-            <a:r>
-              <a:rPr lang="da-DK" sz="4800" dirty="0"/>
-              <a:t>PETPrep+PETSurfer</a:t>
-            </a:r>
-          </a:p>
-          <a:p>
-            <a:pPr marL="685800" indent="-685800">
-              <a:buFontTx/>
-              <a:buChar char="-"/>
-            </a:pPr>
-            <a:r>
-              <a:rPr lang="da-DK" sz="4800" dirty="0"/>
-              <a:t>PETPrep+PETICA</a:t>
-            </a:r>
-          </a:p>
-          <a:p>
-            <a:pPr marL="685800" indent="-685800">
-              <a:buFontTx/>
-              <a:buChar char="-"/>
-            </a:pPr>
-            <a:r>
-              <a:rPr lang="da-DK" sz="4800" dirty="0"/>
-              <a:t>Bloodstream + kinfitR</a:t>
+              <a:rPr lang="en-CA" sz="4800" b="1" u="sng" dirty="0"/>
+              <a:t>Data Workflows</a:t>
             </a:r>
           </a:p>
         </p:txBody>
@@ -4363,8 +4162,8 @@
         </p:nvSpPr>
         <p:spPr>
           <a:xfrm>
-            <a:off x="1159170" y="36264419"/>
-            <a:ext cx="7176003" cy="1569660"/>
+            <a:off x="1532699" y="35745710"/>
+            <a:ext cx="17300442" cy="2308324"/>
           </a:xfrm>
           <a:prstGeom prst="rect">
             <a:avLst/>
@@ -4378,8 +4177,8 @@
           <a:lstStyle/>
           <a:p>
             <a:r>
-              <a:rPr lang="da-DK" sz="4800" b="1" u="sng" dirty="0"/>
-              <a:t>Molecular Atlasing</a:t>
+              <a:rPr lang="en-CA" sz="4800" b="1" u="sng" dirty="0"/>
+              <a:t>Molecular Atlases</a:t>
             </a:r>
           </a:p>
           <a:p>
@@ -4388,8 +4187,14 @@
               <a:buChar char="-"/>
             </a:pPr>
             <a:r>
-              <a:rPr lang="da-DK" sz="4800" dirty="0"/>
-              <a:t>Build and share atlases</a:t>
+              <a:rPr lang="en-CA" sz="4800" dirty="0"/>
+              <a:t>Build and share templates of receptor availability, metabolism,</a:t>
+            </a:r>
+          </a:p>
+          <a:p>
+            <a:r>
+              <a:rPr lang="en-CA" sz="4800" dirty="0"/>
+              <a:t>and enzymatic activity</a:t>
             </a:r>
           </a:p>
         </p:txBody>
@@ -4422,7 +4227,7 @@
         </p:blipFill>
         <p:spPr>
           <a:xfrm>
-            <a:off x="1647300" y="38168193"/>
+            <a:off x="3603309" y="38457844"/>
             <a:ext cx="6135037" cy="2874529"/>
           </a:xfrm>
           <a:prstGeom prst="rect">
@@ -4458,7 +4263,7 @@
         </p:blipFill>
         <p:spPr>
           <a:xfrm>
-            <a:off x="7972226" y="38208954"/>
+            <a:off x="11547596" y="38457843"/>
             <a:ext cx="5329419" cy="2874529"/>
           </a:xfrm>
           <a:prstGeom prst="rect">
@@ -4466,12 +4271,87 @@
           </a:prstGeom>
         </p:spPr>
       </p:pic>
+      <p:sp>
+        <p:nvSpPr>
+          <p:cNvPr id="2" name="TextBox 1">
+            <a:extLst>
+              <a:ext uri="{FF2B5EF4-FFF2-40B4-BE49-F238E27FC236}">
+                <a16:creationId xmlns:a16="http://schemas.microsoft.com/office/drawing/2014/main" id="{DB7B0D12-6B4F-A1A0-0D30-6536B9290BEB}"/>
+              </a:ext>
+            </a:extLst>
+          </p:cNvPr>
+          <p:cNvSpPr txBox="1"/>
+          <p:nvPr/>
+        </p:nvSpPr>
+        <p:spPr>
+          <a:xfrm rot="16200000">
+            <a:off x="1923718" y="39479607"/>
+            <a:ext cx="1942968" cy="830997"/>
+          </a:xfrm>
+          <a:prstGeom prst="rect">
+            <a:avLst/>
+          </a:prstGeom>
+          <a:noFill/>
+        </p:spPr>
+        <p:txBody>
+          <a:bodyPr wrap="none" rtlCol="0">
+            <a:spAutoFit/>
+          </a:bodyPr>
+          <a:lstStyle/>
+          <a:p>
+            <a:r>
+              <a:rPr lang="en-CA" sz="4800" dirty="0"/>
+              <a:t>GABA</a:t>
+            </a:r>
+            <a:r>
+              <a:rPr lang="en-CA" sz="4800" baseline="-25000" dirty="0"/>
+              <a:t>A</a:t>
+            </a:r>
+            <a:endParaRPr lang="en-CA" sz="4800" dirty="0"/>
+          </a:p>
+        </p:txBody>
+      </p:sp>
+      <p:sp>
+        <p:nvSpPr>
+          <p:cNvPr id="3" name="TextBox 2">
+            <a:extLst>
+              <a:ext uri="{FF2B5EF4-FFF2-40B4-BE49-F238E27FC236}">
+                <a16:creationId xmlns:a16="http://schemas.microsoft.com/office/drawing/2014/main" id="{22171E79-D556-3207-0ECB-D6326420F87A}"/>
+              </a:ext>
+            </a:extLst>
+          </p:cNvPr>
+          <p:cNvSpPr txBox="1"/>
+          <p:nvPr/>
+        </p:nvSpPr>
+        <p:spPr>
+          <a:xfrm rot="16200000">
+            <a:off x="10028364" y="39479608"/>
+            <a:ext cx="1749197" cy="830997"/>
+          </a:xfrm>
+          <a:prstGeom prst="rect">
+            <a:avLst/>
+          </a:prstGeom>
+          <a:noFill/>
+        </p:spPr>
+        <p:txBody>
+          <a:bodyPr wrap="none" rtlCol="0">
+            <a:spAutoFit/>
+          </a:bodyPr>
+          <a:lstStyle/>
+          <a:p>
+            <a:r>
+              <a:rPr lang="en-CA" sz="4800" dirty="0"/>
+              <a:t>5-HTT</a:t>
+            </a:r>
+          </a:p>
+        </p:txBody>
+      </p:sp>
       <p:pic>
         <p:nvPicPr>
-          <p:cNvPr id="1050" name="Picture 1049" descr="A screenshot of a computer screen&#10;&#10;Description automatically generated">
+          <p:cNvPr id="4" name="Picture 3" descr="A screenshot of a computer screen&#10;&#10;Description automatically generated">
             <a:extLst>
               <a:ext uri="{FF2B5EF4-FFF2-40B4-BE49-F238E27FC236}">
-                <a16:creationId xmlns:a16="http://schemas.microsoft.com/office/drawing/2014/main" id="{9185D19A-B98F-9E14-588B-A31660782EF7}"/>
+                <a16:creationId xmlns:a16="http://schemas.microsoft.com/office/drawing/2014/main" id="{AE0904F6-160F-1BAB-039A-FD813CFB1DD2}"/>
               </a:ext>
             </a:extLst>
           </p:cNvPr>
@@ -4494,8 +4374,8 @@
         </p:blipFill>
         <p:spPr>
           <a:xfrm>
-            <a:off x="2516344" y="30223566"/>
-            <a:ext cx="7620000" cy="4524375"/>
+            <a:off x="2247438" y="28222694"/>
+            <a:ext cx="9071023" cy="5385920"/>
           </a:xfrm>
           <a:prstGeom prst="rect">
             <a:avLst/>
@@ -4504,10 +4384,10 @@
       </p:pic>
       <p:sp>
         <p:nvSpPr>
-          <p:cNvPr id="1051" name="TextBox 1050">
+          <p:cNvPr id="5" name="TextBox 4">
             <a:extLst>
               <a:ext uri="{FF2B5EF4-FFF2-40B4-BE49-F238E27FC236}">
-                <a16:creationId xmlns:a16="http://schemas.microsoft.com/office/drawing/2014/main" id="{96233FF7-F137-B636-3632-22FC201A46AC}"/>
+                <a16:creationId xmlns:a16="http://schemas.microsoft.com/office/drawing/2014/main" id="{AA0EAA24-F505-9172-1B45-D4338404144B}"/>
               </a:ext>
             </a:extLst>
           </p:cNvPr>
@@ -4516,8 +4396,8 @@
         </p:nvSpPr>
         <p:spPr>
           <a:xfrm>
-            <a:off x="3675353" y="29235492"/>
-            <a:ext cx="5032211" cy="954107"/>
+            <a:off x="3406448" y="27040350"/>
+            <a:ext cx="5990460" cy="1077218"/>
           </a:xfrm>
           <a:prstGeom prst="rect">
             <a:avLst/>
@@ -4525,30 +4405,30 @@
           <a:noFill/>
         </p:spPr>
         <p:txBody>
-          <a:bodyPr wrap="none" rtlCol="0">
+          <a:bodyPr wrap="square" rtlCol="0">
             <a:spAutoFit/>
           </a:bodyPr>
           <a:lstStyle/>
           <a:p>
             <a:pPr algn="ctr"/>
             <a:r>
-              <a:rPr lang="da-DK" sz="2800" b="1" dirty="0">
+              <a:rPr lang="da-DK" sz="3200" b="1" dirty="0">
                 <a:hlinkClick r:id="rId15"/>
               </a:rPr>
               <a:t>GIFT ICA Toolbox </a:t>
             </a:r>
             <a:r>
-              <a:rPr lang="da-DK" sz="2800" b="1" dirty="0"/>
+              <a:rPr lang="da-DK" sz="3200" b="1" dirty="0"/>
               <a:t>for PET </a:t>
             </a:r>
           </a:p>
           <a:p>
             <a:pPr algn="ctr"/>
             <a:r>
-              <a:rPr lang="da-DK" sz="2800" b="1" dirty="0"/>
+              <a:rPr lang="da-DK" sz="3200" b="1" dirty="0"/>
               <a:t>with dedicated PET templates</a:t>
             </a:r>
-            <a:endParaRPr lang="en-DK" sz="2800" b="1" dirty="0"/>
+            <a:endParaRPr lang="en-DK" sz="3200" b="1" dirty="0"/>
           </a:p>
         </p:txBody>
       </p:sp>

</xml_diff>